<commit_message>
checked the flooding area if it makes sense
</commit_message>
<xml_diff>
--- a/presentation/gloria_maresme.pptx
+++ b/presentation/gloria_maresme.pptx
@@ -119,7 +119,7 @@
 <file path=ppt/revisionInfo.xml><?xml version="1.0" encoding="utf-8"?>
 <p1510:revInfo xmlns:a="http://schemas.openxmlformats.org/drawingml/2006/main" xmlns:r="http://schemas.openxmlformats.org/officeDocument/2006/relationships" xmlns:p1510="http://schemas.microsoft.com/office/powerpoint/2015/10/main">
   <p1510:revLst>
-    <p1510:client id="{81A60C2A-9BE7-D767-E009-298B70E67CCC}" v="2010" dt="2024-12-13T12:48:05.803"/>
+    <p1510:client id="{81A60C2A-9BE7-D767-E009-298B70E67CCC}" v="2072" dt="2024-12-13T13:24:44.913"/>
   </p1510:revLst>
 </p1510:revInfo>
 </file>
@@ -3444,9 +3444,8 @@
                 <a:ea typeface="+mn-lt"/>
                 <a:cs typeface="+mn-lt"/>
               </a:rPr>
-              <a:t>flooding area km2: 70.0326</a:t>
-            </a:r>
-            <a:endParaRPr lang="en-US" dirty="0"/>
+              <a:t>road impacted: 76659m</a:t>
+            </a:r>
           </a:p>
           <a:p>
             <a:pPr lvl="1">
@@ -3458,8 +3457,36 @@
                 <a:ea typeface="+mn-lt"/>
                 <a:cs typeface="+mn-lt"/>
               </a:rPr>
-              <a:t>road impacted: 76659m</a:t>
-            </a:r>
+              <a:t>flooding area km2: 70.0326</a:t>
+            </a:r>
+            <a:endParaRPr lang="en-US" dirty="0"/>
+          </a:p>
+          <a:p>
+            <a:pPr lvl="2">
+              <a:buFont typeface="Wingdings" panose="020B0604020202020204" pitchFamily="34" charset="0"/>
+              <a:buChar char="§"/>
+            </a:pPr>
+            <a:r>
+              <a:rPr lang="en-US" sz="1200" dirty="0">
+                <a:solidFill>
+                  <a:srgbClr val="000000"/>
+                </a:solidFill>
+                <a:latin typeface="Aptos"/>
+                <a:ea typeface="Verdana"/>
+                <a:cs typeface="+mn-lt"/>
+              </a:rPr>
+              <a:t>This is about five-and-a-half times as big as London Heathrow Airport, which seems the right size</a:t>
+            </a:r>
+          </a:p>
+          <a:p>
+            <a:pPr lvl="1">
+              <a:buFont typeface="Courier New" panose="020B0604020202020204" pitchFamily="34" charset="0"/>
+              <a:buChar char="o"/>
+            </a:pPr>
+            <a:endParaRPr lang="en-US" sz="1600" dirty="0">
+              <a:ea typeface="+mn-lt"/>
+              <a:cs typeface="+mn-lt"/>
+            </a:endParaRPr>
           </a:p>
           <a:p>
             <a:endParaRPr lang="en-US" sz="2000" dirty="0"/>

</xml_diff>